<commit_message>
Update courseware and security config
</commit_message>
<xml_diff>
--- a/documents/courseware/INTRODUCTION.pptx
+++ b/documents/courseware/INTRODUCTION.pptx
@@ -9,6 +9,10 @@
     <p:sldId id="258" r:id="rId3"/>
     <p:sldId id="259" r:id="rId4"/>
     <p:sldId id="260" r:id="rId5"/>
+    <p:sldId id="261" r:id="rId6"/>
+    <p:sldId id="262" r:id="rId7"/>
+    <p:sldId id="263" r:id="rId8"/>
+    <p:sldId id="264" r:id="rId9"/>
   </p:sldIdLst>
   <p:sldSz cx="9144000" cy="6858000" type="screen4x3"/>
   <p:notesSz cx="6858000" cy="9144000"/>
@@ -4606,6 +4610,1580 @@
     <p:extLst>
       <p:ext uri="{BB962C8B-B14F-4D97-AF65-F5344CB8AC3E}">
         <p14:creationId xmlns:p14="http://schemas.microsoft.com/office/powerpoint/2010/main" val="3250829682"/>
+      </p:ext>
+    </p:extLst>
+  </p:cSld>
+  <p:clrMapOvr>
+    <a:masterClrMapping/>
+  </p:clrMapOvr>
+  <p:timing>
+    <p:tnLst>
+      <p:par>
+        <p:cTn id="1" dur="indefinite" restart="never" nodeType="tmRoot"/>
+      </p:par>
+    </p:tnLst>
+  </p:timing>
+</p:sld>
+</file>
+
+<file path=ppt/slides/slide5.xml><?xml version="1.0" encoding="utf-8"?>
+<p:sld xmlns:a="http://schemas.openxmlformats.org/drawingml/2006/main" xmlns:r="http://schemas.openxmlformats.org/officeDocument/2006/relationships" xmlns:p="http://schemas.openxmlformats.org/presentationml/2006/main">
+  <p:cSld>
+    <p:spTree>
+      <p:nvGrpSpPr>
+        <p:cNvPr id="1" name=""/>
+        <p:cNvGrpSpPr/>
+        <p:nvPr/>
+      </p:nvGrpSpPr>
+      <p:grpSpPr>
+        <a:xfrm>
+          <a:off x="0" y="0"/>
+          <a:ext cx="0" cy="0"/>
+          <a:chOff x="0" y="0"/>
+          <a:chExt cx="0" cy="0"/>
+        </a:xfrm>
+      </p:grpSpPr>
+      <p:sp>
+        <p:nvSpPr>
+          <p:cNvPr id="3" name="Title 2"/>
+          <p:cNvSpPr>
+            <a:spLocks noGrp="1"/>
+          </p:cNvSpPr>
+          <p:nvPr>
+            <p:ph type="ctrTitle"/>
+          </p:nvPr>
+        </p:nvSpPr>
+        <p:spPr>
+          <a:xfrm>
+            <a:off x="689264" y="1"/>
+            <a:ext cx="7772400" cy="1470025"/>
+          </a:xfrm>
+        </p:spPr>
+        <p:txBody>
+          <a:bodyPr>
+            <a:normAutofit/>
+          </a:bodyPr>
+          <a:lstStyle/>
+          <a:p>
+            <a:pPr algn="l"/>
+            <a:r>
+              <a:rPr lang="en-US" smtClean="0">
+                <a:solidFill>
+                  <a:srgbClr val="FF0000"/>
+                </a:solidFill>
+                <a:latin typeface="Arial" panose="020B0604020202020204" pitchFamily="34" charset="0"/>
+                <a:cs typeface="Arial" panose="020B0604020202020204" pitchFamily="34" charset="0"/>
+              </a:rPr>
+              <a:t>Grammar </a:t>
+            </a:r>
+            <a:r>
+              <a:rPr lang="en-US" sz="2800" i="1" smtClean="0">
+                <a:solidFill>
+                  <a:srgbClr val="FF0000"/>
+                </a:solidFill>
+                <a:latin typeface="Arial" panose="020B0604020202020204" pitchFamily="34" charset="0"/>
+                <a:cs typeface="Arial" panose="020B0604020202020204" pitchFamily="34" charset="0"/>
+              </a:rPr>
+              <a:t>(Ngữ pháp)</a:t>
+            </a:r>
+            <a:br>
+              <a:rPr lang="en-US" sz="2800" i="1" smtClean="0">
+                <a:solidFill>
+                  <a:srgbClr val="FF0000"/>
+                </a:solidFill>
+                <a:latin typeface="Arial" panose="020B0604020202020204" pitchFamily="34" charset="0"/>
+                <a:cs typeface="Arial" panose="020B0604020202020204" pitchFamily="34" charset="0"/>
+              </a:rPr>
+            </a:br>
+            <a:endParaRPr lang="en-US" sz="2700" i="1">
+              <a:solidFill>
+                <a:schemeClr val="bg1">
+                  <a:lumMod val="50000"/>
+                </a:schemeClr>
+              </a:solidFill>
+              <a:latin typeface="Arial" panose="020B0604020202020204" pitchFamily="34" charset="0"/>
+              <a:cs typeface="Arial" panose="020B0604020202020204" pitchFamily="34" charset="0"/>
+            </a:endParaRPr>
+          </a:p>
+        </p:txBody>
+      </p:sp>
+      <p:cxnSp>
+        <p:nvCxnSpPr>
+          <p:cNvPr id="8" name="Straight Connector 7"/>
+          <p:cNvCxnSpPr/>
+          <p:nvPr/>
+        </p:nvCxnSpPr>
+        <p:spPr>
+          <a:xfrm>
+            <a:off x="0" y="1447800"/>
+            <a:ext cx="9144000" cy="0"/>
+          </a:xfrm>
+          <a:prstGeom prst="line">
+            <a:avLst/>
+          </a:prstGeom>
+        </p:spPr>
+        <p:style>
+          <a:lnRef idx="1">
+            <a:schemeClr val="accent1"/>
+          </a:lnRef>
+          <a:fillRef idx="0">
+            <a:schemeClr val="accent1"/>
+          </a:fillRef>
+          <a:effectRef idx="0">
+            <a:schemeClr val="accent1"/>
+          </a:effectRef>
+          <a:fontRef idx="minor">
+            <a:schemeClr val="tx1"/>
+          </a:fontRef>
+        </p:style>
+      </p:cxnSp>
+      <p:sp>
+        <p:nvSpPr>
+          <p:cNvPr id="5" name="TextBox 4"/>
+          <p:cNvSpPr txBox="1"/>
+          <p:nvPr/>
+        </p:nvSpPr>
+        <p:spPr>
+          <a:xfrm>
+            <a:off x="641253" y="1602662"/>
+            <a:ext cx="7941691" cy="1200329"/>
+          </a:xfrm>
+          <a:prstGeom prst="rect">
+            <a:avLst/>
+          </a:prstGeom>
+          <a:solidFill>
+            <a:schemeClr val="accent2">
+              <a:lumMod val="20000"/>
+              <a:lumOff val="80000"/>
+            </a:schemeClr>
+          </a:solidFill>
+        </p:spPr>
+        <p:txBody>
+          <a:bodyPr wrap="square" rtlCol="0">
+            <a:spAutoFit/>
+          </a:bodyPr>
+          <a:lstStyle/>
+          <a:p>
+            <a:r>
+              <a:rPr lang="en-US" sz="2400" b="1" smtClean="0">
+                <a:latin typeface="Arial" panose="020B0604020202020204" pitchFamily="34" charset="0"/>
+                <a:cs typeface="Arial" panose="020B0604020202020204" pitchFamily="34" charset="0"/>
+              </a:rPr>
+              <a:t>Structure (Cấu trúc): </a:t>
+            </a:r>
+          </a:p>
+          <a:p>
+            <a:pPr algn="ctr"/>
+            <a:r>
+              <a:rPr lang="en-US" sz="2400" b="1" smtClean="0">
+                <a:latin typeface="Arial" panose="020B0604020202020204" pitchFamily="34" charset="0"/>
+                <a:cs typeface="Arial" panose="020B0604020202020204" pitchFamily="34" charset="0"/>
+              </a:rPr>
+              <a:t>What is your name? </a:t>
+            </a:r>
+            <a:r>
+              <a:rPr lang="en-US" sz="2000" i="1" smtClean="0">
+                <a:latin typeface="Arial" panose="020B0604020202020204" pitchFamily="34" charset="0"/>
+                <a:cs typeface="Arial" panose="020B0604020202020204" pitchFamily="34" charset="0"/>
+              </a:rPr>
+              <a:t>(Tên của bạn là gì?)</a:t>
+            </a:r>
+          </a:p>
+          <a:p>
+            <a:pPr algn="ctr"/>
+            <a:r>
+              <a:rPr lang="en-US" sz="2400" b="1" smtClean="0">
+                <a:latin typeface="Arial" panose="020B0604020202020204" pitchFamily="34" charset="0"/>
+                <a:cs typeface="Arial" panose="020B0604020202020204" pitchFamily="34" charset="0"/>
+              </a:rPr>
+              <a:t>My name is … </a:t>
+            </a:r>
+            <a:r>
+              <a:rPr lang="en-US" sz="2000" i="1" smtClean="0">
+                <a:latin typeface="Arial" panose="020B0604020202020204" pitchFamily="34" charset="0"/>
+                <a:cs typeface="Arial" panose="020B0604020202020204" pitchFamily="34" charset="0"/>
+              </a:rPr>
+              <a:t>(Tên của tôi là… ) </a:t>
+            </a:r>
+            <a:r>
+              <a:rPr lang="en-US" sz="2400" b="1" smtClean="0">
+                <a:latin typeface="Arial" panose="020B0604020202020204" pitchFamily="34" charset="0"/>
+                <a:cs typeface="Arial" panose="020B0604020202020204" pitchFamily="34" charset="0"/>
+              </a:rPr>
+              <a:t>or I am… </a:t>
+            </a:r>
+            <a:r>
+              <a:rPr lang="en-US" sz="2000" i="1" smtClean="0">
+                <a:latin typeface="Arial" panose="020B0604020202020204" pitchFamily="34" charset="0"/>
+                <a:cs typeface="Arial" panose="020B0604020202020204" pitchFamily="34" charset="0"/>
+              </a:rPr>
+              <a:t>(Tôi là…)</a:t>
+            </a:r>
+            <a:endParaRPr lang="en-US" sz="2000" i="1">
+              <a:latin typeface="Arial" panose="020B0604020202020204" pitchFamily="34" charset="0"/>
+              <a:cs typeface="Arial" panose="020B0604020202020204" pitchFamily="34" charset="0"/>
+            </a:endParaRPr>
+          </a:p>
+        </p:txBody>
+      </p:sp>
+      <p:sp>
+        <p:nvSpPr>
+          <p:cNvPr id="6" name="TextBox 5"/>
+          <p:cNvSpPr txBox="1"/>
+          <p:nvPr/>
+        </p:nvSpPr>
+        <p:spPr>
+          <a:xfrm>
+            <a:off x="609600" y="2844555"/>
+            <a:ext cx="8304005" cy="677108"/>
+          </a:xfrm>
+          <a:prstGeom prst="rect">
+            <a:avLst/>
+          </a:prstGeom>
+          <a:solidFill>
+            <a:schemeClr val="accent1">
+              <a:lumMod val="20000"/>
+              <a:lumOff val="80000"/>
+            </a:schemeClr>
+          </a:solidFill>
+        </p:spPr>
+        <p:txBody>
+          <a:bodyPr wrap="none" rtlCol="0">
+            <a:spAutoFit/>
+          </a:bodyPr>
+          <a:lstStyle/>
+          <a:p>
+            <a:r>
+              <a:rPr lang="en-US" sz="2000" b="1" smtClean="0">
+                <a:latin typeface="Arial" panose="020B0604020202020204" pitchFamily="34" charset="0"/>
+                <a:cs typeface="Arial" panose="020B0604020202020204" pitchFamily="34" charset="0"/>
+              </a:rPr>
+              <a:t>Pair work: Ask and answer using the given structure and pictures.</a:t>
+            </a:r>
+          </a:p>
+          <a:p>
+            <a:r>
+              <a:rPr lang="en-US" i="1" smtClean="0">
+                <a:latin typeface="Arial" panose="020B0604020202020204" pitchFamily="34" charset="0"/>
+                <a:cs typeface="Arial" panose="020B0604020202020204" pitchFamily="34" charset="0"/>
+              </a:rPr>
+              <a:t>(Làm theo cặp: Hỏi và trả lời sử dụng cấu trúc và từ cho sẵn)</a:t>
+            </a:r>
+            <a:endParaRPr lang="en-US" i="1">
+              <a:latin typeface="Arial" panose="020B0604020202020204" pitchFamily="34" charset="0"/>
+              <a:cs typeface="Arial" panose="020B0604020202020204" pitchFamily="34" charset="0"/>
+            </a:endParaRPr>
+          </a:p>
+        </p:txBody>
+      </p:sp>
+      <p:sp>
+        <p:nvSpPr>
+          <p:cNvPr id="7" name="TextBox 6"/>
+          <p:cNvSpPr txBox="1"/>
+          <p:nvPr/>
+        </p:nvSpPr>
+        <p:spPr>
+          <a:xfrm>
+            <a:off x="641253" y="3581400"/>
+            <a:ext cx="3493264" cy="923330"/>
+          </a:xfrm>
+          <a:prstGeom prst="rect">
+            <a:avLst/>
+          </a:prstGeom>
+          <a:noFill/>
+        </p:spPr>
+        <p:txBody>
+          <a:bodyPr wrap="none" rtlCol="0">
+            <a:spAutoFit/>
+          </a:bodyPr>
+          <a:lstStyle/>
+          <a:p>
+            <a:r>
+              <a:rPr lang="en-US" b="1" smtClean="0">
+                <a:latin typeface="Arial" panose="020B0604020202020204" pitchFamily="34" charset="0"/>
+                <a:cs typeface="Arial" panose="020B0604020202020204" pitchFamily="34" charset="0"/>
+              </a:rPr>
+              <a:t>Example: </a:t>
+            </a:r>
+          </a:p>
+          <a:p>
+            <a:r>
+              <a:rPr lang="en-US" b="1" smtClean="0">
+                <a:latin typeface="Arial" panose="020B0604020202020204" pitchFamily="34" charset="0"/>
+                <a:cs typeface="Arial" panose="020B0604020202020204" pitchFamily="34" charset="0"/>
+              </a:rPr>
+              <a:t>A</a:t>
+            </a:r>
+            <a:r>
+              <a:rPr lang="en-US" b="1" smtClean="0">
+                <a:solidFill>
+                  <a:srgbClr val="FF0000"/>
+                </a:solidFill>
+                <a:latin typeface="Arial" panose="020B0604020202020204" pitchFamily="34" charset="0"/>
+                <a:cs typeface="Arial" panose="020B0604020202020204" pitchFamily="34" charset="0"/>
+              </a:rPr>
+              <a:t>: What is your name?</a:t>
+            </a:r>
+          </a:p>
+          <a:p>
+            <a:r>
+              <a:rPr lang="en-US" b="1" smtClean="0">
+                <a:latin typeface="Arial" panose="020B0604020202020204" pitchFamily="34" charset="0"/>
+                <a:cs typeface="Arial" panose="020B0604020202020204" pitchFamily="34" charset="0"/>
+              </a:rPr>
+              <a:t>B: </a:t>
+            </a:r>
+            <a:r>
+              <a:rPr lang="en-US" b="1" smtClean="0">
+                <a:solidFill>
+                  <a:srgbClr val="FF0000"/>
+                </a:solidFill>
+                <a:latin typeface="Arial" panose="020B0604020202020204" pitchFamily="34" charset="0"/>
+                <a:cs typeface="Arial" panose="020B0604020202020204" pitchFamily="34" charset="0"/>
+              </a:rPr>
+              <a:t>My name is</a:t>
+            </a:r>
+            <a:r>
+              <a:rPr lang="en-US" b="1" smtClean="0">
+                <a:latin typeface="Arial" panose="020B0604020202020204" pitchFamily="34" charset="0"/>
+                <a:cs typeface="Arial" panose="020B0604020202020204" pitchFamily="34" charset="0"/>
+              </a:rPr>
+              <a:t> </a:t>
+            </a:r>
+            <a:r>
+              <a:rPr lang="en-US" smtClean="0">
+                <a:latin typeface="Arial" panose="020B0604020202020204" pitchFamily="34" charset="0"/>
+                <a:cs typeface="Arial" panose="020B0604020202020204" pitchFamily="34" charset="0"/>
+              </a:rPr>
+              <a:t>Danh./ </a:t>
+            </a:r>
+            <a:r>
+              <a:rPr lang="en-US" b="1" smtClean="0">
+                <a:solidFill>
+                  <a:srgbClr val="FF0000"/>
+                </a:solidFill>
+                <a:latin typeface="Arial" panose="020B0604020202020204" pitchFamily="34" charset="0"/>
+                <a:cs typeface="Arial" panose="020B0604020202020204" pitchFamily="34" charset="0"/>
+              </a:rPr>
+              <a:t>I am </a:t>
+            </a:r>
+            <a:r>
+              <a:rPr lang="en-US" smtClean="0">
+                <a:latin typeface="Arial" panose="020B0604020202020204" pitchFamily="34" charset="0"/>
+                <a:cs typeface="Arial" panose="020B0604020202020204" pitchFamily="34" charset="0"/>
+              </a:rPr>
+              <a:t>Mai.</a:t>
+            </a:r>
+            <a:endParaRPr lang="en-US">
+              <a:latin typeface="Arial" panose="020B0604020202020204" pitchFamily="34" charset="0"/>
+              <a:cs typeface="Arial" panose="020B0604020202020204" pitchFamily="34" charset="0"/>
+            </a:endParaRPr>
+          </a:p>
+        </p:txBody>
+      </p:sp>
+      <p:pic>
+        <p:nvPicPr>
+          <p:cNvPr id="1026" name="Picture 2" descr="Kết quả hình ảnh cho mr bean"/>
+          <p:cNvPicPr>
+            <a:picLocks noChangeAspect="1" noChangeArrowheads="1"/>
+          </p:cNvPicPr>
+          <p:nvPr/>
+        </p:nvPicPr>
+        <p:blipFill>
+          <a:blip r:embed="rId2" cstate="print">
+            <a:extLst>
+              <a:ext uri="{28A0092B-C50C-407E-A947-70E740481C1C}">
+                <a14:useLocalDpi xmlns:a14="http://schemas.microsoft.com/office/drawing/2010/main" val="0"/>
+              </a:ext>
+            </a:extLst>
+          </a:blip>
+          <a:srcRect/>
+          <a:stretch>
+            <a:fillRect/>
+          </a:stretch>
+        </p:blipFill>
+        <p:spPr bwMode="auto">
+          <a:xfrm>
+            <a:off x="1727724" y="4803347"/>
+            <a:ext cx="1510475" cy="1213707"/>
+          </a:xfrm>
+          <a:prstGeom prst="rect">
+            <a:avLst/>
+          </a:prstGeom>
+          <a:noFill/>
+          <a:extLst>
+            <a:ext uri="{909E8E84-426E-40DD-AFC4-6F175D3DCCD1}">
+              <a14:hiddenFill xmlns:a14="http://schemas.microsoft.com/office/drawing/2010/main">
+                <a:solidFill>
+                  <a:srgbClr val="FFFFFF"/>
+                </a:solidFill>
+              </a14:hiddenFill>
+            </a:ext>
+          </a:extLst>
+        </p:spPr>
+      </p:pic>
+      <p:pic>
+        <p:nvPicPr>
+          <p:cNvPr id="1028" name="Picture 4" descr="Kết quả hình ảnh cho james bond"/>
+          <p:cNvPicPr>
+            <a:picLocks noChangeAspect="1" noChangeArrowheads="1"/>
+          </p:cNvPicPr>
+          <p:nvPr/>
+        </p:nvPicPr>
+        <p:blipFill>
+          <a:blip r:embed="rId3" cstate="print">
+            <a:extLst>
+              <a:ext uri="{28A0092B-C50C-407E-A947-70E740481C1C}">
+                <a14:useLocalDpi xmlns:a14="http://schemas.microsoft.com/office/drawing/2010/main" val="0"/>
+              </a:ext>
+            </a:extLst>
+          </a:blip>
+          <a:srcRect/>
+          <a:stretch>
+            <a:fillRect/>
+          </a:stretch>
+        </p:blipFill>
+        <p:spPr bwMode="auto">
+          <a:xfrm>
+            <a:off x="3851322" y="4803347"/>
+            <a:ext cx="1820559" cy="1213706"/>
+          </a:xfrm>
+          <a:prstGeom prst="rect">
+            <a:avLst/>
+          </a:prstGeom>
+          <a:noFill/>
+          <a:extLst>
+            <a:ext uri="{909E8E84-426E-40DD-AFC4-6F175D3DCCD1}">
+              <a14:hiddenFill xmlns:a14="http://schemas.microsoft.com/office/drawing/2010/main">
+                <a:solidFill>
+                  <a:srgbClr val="FFFFFF"/>
+                </a:solidFill>
+              </a14:hiddenFill>
+            </a:ext>
+          </a:extLst>
+        </p:spPr>
+      </p:pic>
+      <p:pic>
+        <p:nvPicPr>
+          <p:cNvPr id="1030" name="Picture 6" descr="Kết quả hình ảnh cho donald"/>
+          <p:cNvPicPr>
+            <a:picLocks noChangeAspect="1" noChangeArrowheads="1"/>
+          </p:cNvPicPr>
+          <p:nvPr/>
+        </p:nvPicPr>
+        <p:blipFill>
+          <a:blip r:embed="rId4" cstate="print">
+            <a:extLst>
+              <a:ext uri="{28A0092B-C50C-407E-A947-70E740481C1C}">
+                <a14:useLocalDpi xmlns:a14="http://schemas.microsoft.com/office/drawing/2010/main" val="0"/>
+              </a:ext>
+            </a:extLst>
+          </a:blip>
+          <a:srcRect/>
+          <a:stretch>
+            <a:fillRect/>
+          </a:stretch>
+        </p:blipFill>
+        <p:spPr bwMode="auto">
+          <a:xfrm>
+            <a:off x="6245502" y="4788327"/>
+            <a:ext cx="1228725" cy="1228725"/>
+          </a:xfrm>
+          <a:prstGeom prst="rect">
+            <a:avLst/>
+          </a:prstGeom>
+          <a:noFill/>
+          <a:extLst>
+            <a:ext uri="{909E8E84-426E-40DD-AFC4-6F175D3DCCD1}">
+              <a14:hiddenFill xmlns:a14="http://schemas.microsoft.com/office/drawing/2010/main">
+                <a:solidFill>
+                  <a:srgbClr val="FFFFFF"/>
+                </a:solidFill>
+              </a14:hiddenFill>
+            </a:ext>
+          </a:extLst>
+        </p:spPr>
+      </p:pic>
+      <p:sp>
+        <p:nvSpPr>
+          <p:cNvPr id="9" name="TextBox 8"/>
+          <p:cNvSpPr txBox="1"/>
+          <p:nvPr/>
+        </p:nvSpPr>
+        <p:spPr>
+          <a:xfrm>
+            <a:off x="2057400" y="6017054"/>
+            <a:ext cx="1022268" cy="369332"/>
+          </a:xfrm>
+          <a:prstGeom prst="rect">
+            <a:avLst/>
+          </a:prstGeom>
+          <a:noFill/>
+        </p:spPr>
+        <p:txBody>
+          <a:bodyPr wrap="none" rtlCol="0">
+            <a:spAutoFit/>
+          </a:bodyPr>
+          <a:lstStyle/>
+          <a:p>
+            <a:r>
+              <a:rPr lang="en-US" smtClean="0"/>
+              <a:t>Mr. Bean</a:t>
+            </a:r>
+            <a:endParaRPr lang="en-US"/>
+          </a:p>
+        </p:txBody>
+      </p:sp>
+      <p:sp>
+        <p:nvSpPr>
+          <p:cNvPr id="13" name="TextBox 12"/>
+          <p:cNvSpPr txBox="1"/>
+          <p:nvPr/>
+        </p:nvSpPr>
+        <p:spPr>
+          <a:xfrm>
+            <a:off x="4108241" y="6019800"/>
+            <a:ext cx="1301959" cy="369332"/>
+          </a:xfrm>
+          <a:prstGeom prst="rect">
+            <a:avLst/>
+          </a:prstGeom>
+          <a:noFill/>
+        </p:spPr>
+        <p:txBody>
+          <a:bodyPr wrap="none" rtlCol="0">
+            <a:spAutoFit/>
+          </a:bodyPr>
+          <a:lstStyle/>
+          <a:p>
+            <a:r>
+              <a:rPr lang="en-US" smtClean="0"/>
+              <a:t>James Bond</a:t>
+            </a:r>
+            <a:endParaRPr lang="en-US"/>
+          </a:p>
+        </p:txBody>
+      </p:sp>
+      <p:sp>
+        <p:nvSpPr>
+          <p:cNvPr id="14" name="TextBox 13"/>
+          <p:cNvSpPr txBox="1"/>
+          <p:nvPr/>
+        </p:nvSpPr>
+        <p:spPr>
+          <a:xfrm>
+            <a:off x="6458875" y="6019800"/>
+            <a:ext cx="856325" cy="369332"/>
+          </a:xfrm>
+          <a:prstGeom prst="rect">
+            <a:avLst/>
+          </a:prstGeom>
+          <a:noFill/>
+        </p:spPr>
+        <p:txBody>
+          <a:bodyPr wrap="none" rtlCol="0">
+            <a:spAutoFit/>
+          </a:bodyPr>
+          <a:lstStyle/>
+          <a:p>
+            <a:r>
+              <a:rPr lang="en-US" smtClean="0"/>
+              <a:t>Donald</a:t>
+            </a:r>
+            <a:endParaRPr lang="en-US"/>
+          </a:p>
+        </p:txBody>
+      </p:sp>
+    </p:spTree>
+    <p:extLst>
+      <p:ext uri="{BB962C8B-B14F-4D97-AF65-F5344CB8AC3E}">
+        <p14:creationId xmlns:p14="http://schemas.microsoft.com/office/powerpoint/2010/main" val="1707299608"/>
+      </p:ext>
+    </p:extLst>
+  </p:cSld>
+  <p:clrMapOvr>
+    <a:masterClrMapping/>
+  </p:clrMapOvr>
+  <p:timing>
+    <p:tnLst>
+      <p:par>
+        <p:cTn id="1" dur="indefinite" restart="never" nodeType="tmRoot"/>
+      </p:par>
+    </p:tnLst>
+  </p:timing>
+</p:sld>
+</file>
+
+<file path=ppt/slides/slide6.xml><?xml version="1.0" encoding="utf-8"?>
+<p:sld xmlns:a="http://schemas.openxmlformats.org/drawingml/2006/main" xmlns:r="http://schemas.openxmlformats.org/officeDocument/2006/relationships" xmlns:p="http://schemas.openxmlformats.org/presentationml/2006/main">
+  <p:cSld>
+    <p:spTree>
+      <p:nvGrpSpPr>
+        <p:cNvPr id="1" name=""/>
+        <p:cNvGrpSpPr/>
+        <p:nvPr/>
+      </p:nvGrpSpPr>
+      <p:grpSpPr>
+        <a:xfrm>
+          <a:off x="0" y="0"/>
+          <a:ext cx="0" cy="0"/>
+          <a:chOff x="0" y="0"/>
+          <a:chExt cx="0" cy="0"/>
+        </a:xfrm>
+      </p:grpSpPr>
+      <p:sp>
+        <p:nvSpPr>
+          <p:cNvPr id="3" name="Title 2"/>
+          <p:cNvSpPr>
+            <a:spLocks noGrp="1"/>
+          </p:cNvSpPr>
+          <p:nvPr>
+            <p:ph type="ctrTitle"/>
+          </p:nvPr>
+        </p:nvSpPr>
+        <p:spPr>
+          <a:xfrm>
+            <a:off x="689264" y="1"/>
+            <a:ext cx="7772400" cy="1470025"/>
+          </a:xfrm>
+        </p:spPr>
+        <p:txBody>
+          <a:bodyPr>
+            <a:normAutofit fontScale="90000"/>
+          </a:bodyPr>
+          <a:lstStyle/>
+          <a:p>
+            <a:pPr algn="l"/>
+            <a:r>
+              <a:rPr lang="en-US" smtClean="0">
+                <a:solidFill>
+                  <a:srgbClr val="FF0000"/>
+                </a:solidFill>
+                <a:latin typeface="Arial" panose="020B0604020202020204" pitchFamily="34" charset="0"/>
+                <a:cs typeface="Arial" panose="020B0604020202020204" pitchFamily="34" charset="0"/>
+              </a:rPr>
+              <a:t>Common sentences </a:t>
+            </a:r>
+            <a:br>
+              <a:rPr lang="en-US" smtClean="0">
+                <a:solidFill>
+                  <a:srgbClr val="FF0000"/>
+                </a:solidFill>
+                <a:latin typeface="Arial" panose="020B0604020202020204" pitchFamily="34" charset="0"/>
+                <a:cs typeface="Arial" panose="020B0604020202020204" pitchFamily="34" charset="0"/>
+              </a:rPr>
+            </a:br>
+            <a:r>
+              <a:rPr lang="en-US" sz="2800" i="1" smtClean="0">
+                <a:solidFill>
+                  <a:srgbClr val="FF0000"/>
+                </a:solidFill>
+                <a:latin typeface="Arial" panose="020B0604020202020204" pitchFamily="34" charset="0"/>
+                <a:cs typeface="Arial" panose="020B0604020202020204" pitchFamily="34" charset="0"/>
+              </a:rPr>
+              <a:t>(Diễn đạt thông dụng)</a:t>
+            </a:r>
+            <a:r>
+              <a:rPr lang="en-US" sz="2800" i="1" smtClean="0">
+                <a:solidFill>
+                  <a:srgbClr val="FF0000"/>
+                </a:solidFill>
+                <a:latin typeface="Arial" panose="020B0604020202020204" pitchFamily="34" charset="0"/>
+                <a:cs typeface="Arial" panose="020B0604020202020204" pitchFamily="34" charset="0"/>
+              </a:rPr>
+              <a:t/>
+            </a:r>
+            <a:br>
+              <a:rPr lang="en-US" sz="2800" i="1" smtClean="0">
+                <a:solidFill>
+                  <a:srgbClr val="FF0000"/>
+                </a:solidFill>
+                <a:latin typeface="Arial" panose="020B0604020202020204" pitchFamily="34" charset="0"/>
+                <a:cs typeface="Arial" panose="020B0604020202020204" pitchFamily="34" charset="0"/>
+              </a:rPr>
+            </a:br>
+            <a:endParaRPr lang="en-US" sz="2700" i="1">
+              <a:solidFill>
+                <a:schemeClr val="bg1">
+                  <a:lumMod val="50000"/>
+                </a:schemeClr>
+              </a:solidFill>
+              <a:latin typeface="Arial" panose="020B0604020202020204" pitchFamily="34" charset="0"/>
+              <a:cs typeface="Arial" panose="020B0604020202020204" pitchFamily="34" charset="0"/>
+            </a:endParaRPr>
+          </a:p>
+        </p:txBody>
+      </p:sp>
+      <p:cxnSp>
+        <p:nvCxnSpPr>
+          <p:cNvPr id="8" name="Straight Connector 7"/>
+          <p:cNvCxnSpPr/>
+          <p:nvPr/>
+        </p:nvCxnSpPr>
+        <p:spPr>
+          <a:xfrm>
+            <a:off x="0" y="1447800"/>
+            <a:ext cx="9144000" cy="0"/>
+          </a:xfrm>
+          <a:prstGeom prst="line">
+            <a:avLst/>
+          </a:prstGeom>
+        </p:spPr>
+        <p:style>
+          <a:lnRef idx="1">
+            <a:schemeClr val="accent1"/>
+          </a:lnRef>
+          <a:fillRef idx="0">
+            <a:schemeClr val="accent1"/>
+          </a:fillRef>
+          <a:effectRef idx="0">
+            <a:schemeClr val="accent1"/>
+          </a:effectRef>
+          <a:fontRef idx="minor">
+            <a:schemeClr val="tx1"/>
+          </a:fontRef>
+        </p:style>
+      </p:cxnSp>
+      <p:sp>
+        <p:nvSpPr>
+          <p:cNvPr id="5" name="TextBox 4"/>
+          <p:cNvSpPr txBox="1"/>
+          <p:nvPr/>
+        </p:nvSpPr>
+        <p:spPr>
+          <a:xfrm>
+            <a:off x="641253" y="1602662"/>
+            <a:ext cx="7941691" cy="2677656"/>
+          </a:xfrm>
+          <a:prstGeom prst="rect">
+            <a:avLst/>
+          </a:prstGeom>
+          <a:solidFill>
+            <a:schemeClr val="accent2">
+              <a:lumMod val="20000"/>
+              <a:lumOff val="80000"/>
+            </a:schemeClr>
+          </a:solidFill>
+        </p:spPr>
+        <p:txBody>
+          <a:bodyPr wrap="square" rtlCol="0">
+            <a:spAutoFit/>
+          </a:bodyPr>
+          <a:lstStyle/>
+          <a:p>
+            <a:pPr marL="457200" indent="-457200">
+              <a:buAutoNum type="arabicPeriod"/>
+            </a:pPr>
+            <a:r>
+              <a:rPr lang="en-US" sz="2400" b="1" smtClean="0">
+                <a:latin typeface="Arial" panose="020B0604020202020204" pitchFamily="34" charset="0"/>
+                <a:cs typeface="Arial" panose="020B0604020202020204" pitchFamily="34" charset="0"/>
+              </a:rPr>
+              <a:t>Nice to meet you! </a:t>
+            </a:r>
+            <a:r>
+              <a:rPr lang="en-US" sz="2400" i="1" smtClean="0">
+                <a:latin typeface="Arial" panose="020B0604020202020204" pitchFamily="34" charset="0"/>
+                <a:cs typeface="Arial" panose="020B0604020202020204" pitchFamily="34" charset="0"/>
+              </a:rPr>
+              <a:t>(Rất vui được gặp bạn!)</a:t>
+            </a:r>
+          </a:p>
+          <a:p>
+            <a:pPr marL="457200" indent="-457200">
+              <a:buAutoNum type="arabicPeriod"/>
+            </a:pPr>
+            <a:endParaRPr lang="en-US" sz="2400" b="1" smtClean="0">
+              <a:latin typeface="Arial" panose="020B0604020202020204" pitchFamily="34" charset="0"/>
+              <a:cs typeface="Arial" panose="020B0604020202020204" pitchFamily="34" charset="0"/>
+            </a:endParaRPr>
+          </a:p>
+          <a:p>
+            <a:pPr marL="457200" indent="-457200">
+              <a:buAutoNum type="arabicPeriod"/>
+            </a:pPr>
+            <a:r>
+              <a:rPr lang="en-US" sz="2400" b="1" i="1" smtClean="0">
+                <a:latin typeface="Arial" panose="020B0604020202020204" pitchFamily="34" charset="0"/>
+                <a:cs typeface="Arial" panose="020B0604020202020204" pitchFamily="34" charset="0"/>
+              </a:rPr>
+              <a:t>How do you do? </a:t>
+            </a:r>
+            <a:r>
+              <a:rPr lang="en-US" sz="2400" i="1" smtClean="0">
+                <a:latin typeface="Arial" panose="020B0604020202020204" pitchFamily="34" charset="0"/>
+                <a:cs typeface="Arial" panose="020B0604020202020204" pitchFamily="34" charset="0"/>
+              </a:rPr>
+              <a:t>(Hân hạnh được gặp bạn)</a:t>
+            </a:r>
+          </a:p>
+          <a:p>
+            <a:pPr marL="457200" indent="-457200">
+              <a:buAutoNum type="arabicPeriod"/>
+            </a:pPr>
+            <a:endParaRPr lang="en-US" sz="2400" b="1" i="1" smtClean="0">
+              <a:latin typeface="Arial" panose="020B0604020202020204" pitchFamily="34" charset="0"/>
+              <a:cs typeface="Arial" panose="020B0604020202020204" pitchFamily="34" charset="0"/>
+            </a:endParaRPr>
+          </a:p>
+          <a:p>
+            <a:pPr marL="457200" indent="-457200">
+              <a:buAutoNum type="arabicPeriod"/>
+            </a:pPr>
+            <a:r>
+              <a:rPr lang="en-US" sz="2400" b="1" i="1" smtClean="0">
+                <a:latin typeface="Arial" panose="020B0604020202020204" pitchFamily="34" charset="0"/>
+                <a:cs typeface="Arial" panose="020B0604020202020204" pitchFamily="34" charset="0"/>
+              </a:rPr>
+              <a:t>Glad to meet you! </a:t>
+            </a:r>
+            <a:r>
+              <a:rPr lang="en-US" sz="2400" i="1" smtClean="0">
+                <a:latin typeface="Arial" panose="020B0604020202020204" pitchFamily="34" charset="0"/>
+                <a:cs typeface="Arial" panose="020B0604020202020204" pitchFamily="34" charset="0"/>
+              </a:rPr>
+              <a:t>(Thật vui khi gặp bạn!)</a:t>
+            </a:r>
+          </a:p>
+          <a:p>
+            <a:pPr marL="457200" indent="-457200">
+              <a:buAutoNum type="arabicPeriod"/>
+            </a:pPr>
+            <a:endParaRPr lang="en-US" sz="2400" b="1" i="1" smtClean="0">
+              <a:latin typeface="Arial" panose="020B0604020202020204" pitchFamily="34" charset="0"/>
+              <a:cs typeface="Arial" panose="020B0604020202020204" pitchFamily="34" charset="0"/>
+            </a:endParaRPr>
+          </a:p>
+          <a:p>
+            <a:pPr marL="457200" indent="-457200">
+              <a:buAutoNum type="arabicPeriod"/>
+            </a:pPr>
+            <a:r>
+              <a:rPr lang="en-US" sz="2400" b="1" i="1" smtClean="0">
+                <a:latin typeface="Arial" panose="020B0604020202020204" pitchFamily="34" charset="0"/>
+                <a:cs typeface="Arial" panose="020B0604020202020204" pitchFamily="34" charset="0"/>
+              </a:rPr>
+              <a:t>Welcome! </a:t>
+            </a:r>
+            <a:r>
+              <a:rPr lang="en-US" sz="2400" i="1" smtClean="0">
+                <a:latin typeface="Arial" panose="020B0604020202020204" pitchFamily="34" charset="0"/>
+                <a:cs typeface="Arial" panose="020B0604020202020204" pitchFamily="34" charset="0"/>
+              </a:rPr>
+              <a:t>(Hoan nghênh!)</a:t>
+            </a:r>
+            <a:endParaRPr lang="en-US" sz="2000" i="1">
+              <a:latin typeface="Arial" panose="020B0604020202020204" pitchFamily="34" charset="0"/>
+              <a:cs typeface="Arial" panose="020B0604020202020204" pitchFamily="34" charset="0"/>
+            </a:endParaRPr>
+          </a:p>
+        </p:txBody>
+      </p:sp>
+    </p:spTree>
+    <p:extLst>
+      <p:ext uri="{BB962C8B-B14F-4D97-AF65-F5344CB8AC3E}">
+        <p14:creationId xmlns:p14="http://schemas.microsoft.com/office/powerpoint/2010/main" val="3398752727"/>
+      </p:ext>
+    </p:extLst>
+  </p:cSld>
+  <p:clrMapOvr>
+    <a:masterClrMapping/>
+  </p:clrMapOvr>
+  <p:timing>
+    <p:tnLst>
+      <p:par>
+        <p:cTn id="1" dur="indefinite" restart="never" nodeType="tmRoot"/>
+      </p:par>
+    </p:tnLst>
+  </p:timing>
+</p:sld>
+</file>
+
+<file path=ppt/slides/slide7.xml><?xml version="1.0" encoding="utf-8"?>
+<p:sld xmlns:a="http://schemas.openxmlformats.org/drawingml/2006/main" xmlns:r="http://schemas.openxmlformats.org/officeDocument/2006/relationships" xmlns:p="http://schemas.openxmlformats.org/presentationml/2006/main">
+  <p:cSld>
+    <p:spTree>
+      <p:nvGrpSpPr>
+        <p:cNvPr id="1" name=""/>
+        <p:cNvGrpSpPr/>
+        <p:nvPr/>
+      </p:nvGrpSpPr>
+      <p:grpSpPr>
+        <a:xfrm>
+          <a:off x="0" y="0"/>
+          <a:ext cx="0" cy="0"/>
+          <a:chOff x="0" y="0"/>
+          <a:chExt cx="0" cy="0"/>
+        </a:xfrm>
+      </p:grpSpPr>
+      <p:sp>
+        <p:nvSpPr>
+          <p:cNvPr id="3" name="Title 2"/>
+          <p:cNvSpPr>
+            <a:spLocks noGrp="1"/>
+          </p:cNvSpPr>
+          <p:nvPr>
+            <p:ph type="ctrTitle"/>
+          </p:nvPr>
+        </p:nvSpPr>
+        <p:spPr>
+          <a:xfrm>
+            <a:off x="689264" y="1"/>
+            <a:ext cx="8454736" cy="1470025"/>
+          </a:xfrm>
+        </p:spPr>
+        <p:txBody>
+          <a:bodyPr>
+            <a:normAutofit fontScale="90000"/>
+          </a:bodyPr>
+          <a:lstStyle/>
+          <a:p>
+            <a:pPr algn="l"/>
+            <a:r>
+              <a:rPr lang="en-US" smtClean="0">
+                <a:solidFill>
+                  <a:srgbClr val="FF0000"/>
+                </a:solidFill>
+                <a:latin typeface="Arial" panose="020B0604020202020204" pitchFamily="34" charset="0"/>
+                <a:cs typeface="Arial" panose="020B0604020202020204" pitchFamily="34" charset="0"/>
+              </a:rPr>
+              <a:t>Conversation </a:t>
+            </a:r>
+            <a:r>
+              <a:rPr lang="en-US" sz="2800" i="1" smtClean="0">
+                <a:solidFill>
+                  <a:srgbClr val="FF0000"/>
+                </a:solidFill>
+                <a:latin typeface="Arial" panose="020B0604020202020204" pitchFamily="34" charset="0"/>
+                <a:cs typeface="Arial" panose="020B0604020202020204" pitchFamily="34" charset="0"/>
+              </a:rPr>
+              <a:t>(Hội thoại)</a:t>
+            </a:r>
+            <a:r>
+              <a:rPr lang="en-US" sz="2800" i="1" smtClean="0">
+                <a:solidFill>
+                  <a:srgbClr val="FF0000"/>
+                </a:solidFill>
+                <a:latin typeface="Arial" panose="020B0604020202020204" pitchFamily="34" charset="0"/>
+                <a:cs typeface="Arial" panose="020B0604020202020204" pitchFamily="34" charset="0"/>
+              </a:rPr>
+              <a:t/>
+            </a:r>
+            <a:br>
+              <a:rPr lang="en-US" sz="2800" i="1" smtClean="0">
+                <a:solidFill>
+                  <a:srgbClr val="FF0000"/>
+                </a:solidFill>
+                <a:latin typeface="Arial" panose="020B0604020202020204" pitchFamily="34" charset="0"/>
+                <a:cs typeface="Arial" panose="020B0604020202020204" pitchFamily="34" charset="0"/>
+              </a:rPr>
+            </a:br>
+            <a:r>
+              <a:rPr lang="en-US" sz="1800" i="1" smtClean="0">
+                <a:latin typeface="Arial" panose="020B0604020202020204" pitchFamily="34" charset="0"/>
+                <a:cs typeface="Arial" panose="020B0604020202020204" pitchFamily="34" charset="0"/>
+              </a:rPr>
+              <a:t>Pair work: In 90 seconds, fill in the blanks and practice one conversation with your partner. </a:t>
+            </a:r>
+            <a:br>
+              <a:rPr lang="en-US" sz="1800" i="1" smtClean="0">
+                <a:latin typeface="Arial" panose="020B0604020202020204" pitchFamily="34" charset="0"/>
+                <a:cs typeface="Arial" panose="020B0604020202020204" pitchFamily="34" charset="0"/>
+              </a:rPr>
+            </a:br>
+            <a:r>
+              <a:rPr lang="en-US" sz="1800" i="1" smtClean="0">
+                <a:solidFill>
+                  <a:schemeClr val="bg1">
+                    <a:lumMod val="50000"/>
+                  </a:schemeClr>
+                </a:solidFill>
+                <a:latin typeface="Arial" panose="020B0604020202020204" pitchFamily="34" charset="0"/>
+                <a:cs typeface="Arial" panose="020B0604020202020204" pitchFamily="34" charset="0"/>
+              </a:rPr>
+              <a:t>(Làm theo cặp: Trong 90 giây, điên từ còn thiếu vào chỗ trống &amp; luyện tập 1 đoạn hội thoại với bạn mình.)</a:t>
+            </a:r>
+            <a:endParaRPr lang="en-US" sz="1800" i="1">
+              <a:solidFill>
+                <a:schemeClr val="bg1">
+                  <a:lumMod val="50000"/>
+                </a:schemeClr>
+              </a:solidFill>
+              <a:latin typeface="Arial" panose="020B0604020202020204" pitchFamily="34" charset="0"/>
+              <a:cs typeface="Arial" panose="020B0604020202020204" pitchFamily="34" charset="0"/>
+            </a:endParaRPr>
+          </a:p>
+        </p:txBody>
+      </p:sp>
+      <p:cxnSp>
+        <p:nvCxnSpPr>
+          <p:cNvPr id="8" name="Straight Connector 7"/>
+          <p:cNvCxnSpPr/>
+          <p:nvPr/>
+        </p:nvCxnSpPr>
+        <p:spPr>
+          <a:xfrm>
+            <a:off x="0" y="1447800"/>
+            <a:ext cx="9144000" cy="0"/>
+          </a:xfrm>
+          <a:prstGeom prst="line">
+            <a:avLst/>
+          </a:prstGeom>
+        </p:spPr>
+        <p:style>
+          <a:lnRef idx="1">
+            <a:schemeClr val="accent1"/>
+          </a:lnRef>
+          <a:fillRef idx="0">
+            <a:schemeClr val="accent1"/>
+          </a:fillRef>
+          <a:effectRef idx="0">
+            <a:schemeClr val="accent1"/>
+          </a:effectRef>
+          <a:fontRef idx="minor">
+            <a:schemeClr val="tx1"/>
+          </a:fontRef>
+        </p:style>
+      </p:cxnSp>
+      <p:sp>
+        <p:nvSpPr>
+          <p:cNvPr id="5" name="TextBox 4"/>
+          <p:cNvSpPr txBox="1"/>
+          <p:nvPr/>
+        </p:nvSpPr>
+        <p:spPr>
+          <a:xfrm>
+            <a:off x="641253" y="1602662"/>
+            <a:ext cx="7941691" cy="2308324"/>
+          </a:xfrm>
+          <a:prstGeom prst="rect">
+            <a:avLst/>
+          </a:prstGeom>
+          <a:solidFill>
+            <a:schemeClr val="accent2">
+              <a:lumMod val="20000"/>
+              <a:lumOff val="80000"/>
+            </a:schemeClr>
+          </a:solidFill>
+        </p:spPr>
+        <p:txBody>
+          <a:bodyPr wrap="square" rtlCol="0">
+            <a:spAutoFit/>
+          </a:bodyPr>
+          <a:lstStyle/>
+          <a:p>
+            <a:r>
+              <a:rPr lang="en-US" sz="2400" b="1" smtClean="0">
+                <a:latin typeface="Arial" panose="020B0604020202020204" pitchFamily="34" charset="0"/>
+                <a:cs typeface="Arial" panose="020B0604020202020204" pitchFamily="34" charset="0"/>
+              </a:rPr>
+              <a:t>Dialogue 1 (hội thoại 1):</a:t>
+            </a:r>
+          </a:p>
+          <a:p>
+            <a:endParaRPr lang="en-US" sz="2400" b="1" smtClean="0">
+              <a:latin typeface="Arial" panose="020B0604020202020204" pitchFamily="34" charset="0"/>
+              <a:cs typeface="Arial" panose="020B0604020202020204" pitchFamily="34" charset="0"/>
+            </a:endParaRPr>
+          </a:p>
+          <a:p>
+            <a:r>
+              <a:rPr lang="en-US" sz="2400" b="1" i="1" smtClean="0">
+                <a:latin typeface="Arial" panose="020B0604020202020204" pitchFamily="34" charset="0"/>
+                <a:cs typeface="Arial" panose="020B0604020202020204" pitchFamily="34" charset="0"/>
+              </a:rPr>
+              <a:t>A: </a:t>
+            </a:r>
+            <a:r>
+              <a:rPr lang="en-US" sz="2400" i="1" smtClean="0">
+                <a:latin typeface="Arial" panose="020B0604020202020204" pitchFamily="34" charset="0"/>
+                <a:cs typeface="Arial" panose="020B0604020202020204" pitchFamily="34" charset="0"/>
+              </a:rPr>
+              <a:t>Hello!</a:t>
+            </a:r>
+          </a:p>
+          <a:p>
+            <a:r>
+              <a:rPr lang="en-US" sz="2400" b="1" i="1" smtClean="0">
+                <a:latin typeface="Arial" panose="020B0604020202020204" pitchFamily="34" charset="0"/>
+                <a:cs typeface="Arial" panose="020B0604020202020204" pitchFamily="34" charset="0"/>
+              </a:rPr>
+              <a:t>B: </a:t>
+            </a:r>
+            <a:r>
+              <a:rPr lang="en-US" sz="2400" i="1" smtClean="0">
+                <a:latin typeface="Arial" panose="020B0604020202020204" pitchFamily="34" charset="0"/>
+                <a:cs typeface="Arial" panose="020B0604020202020204" pitchFamily="34" charset="0"/>
+              </a:rPr>
+              <a:t>……! My ……… is Trang. What is …… name?</a:t>
+            </a:r>
+          </a:p>
+          <a:p>
+            <a:r>
+              <a:rPr lang="en-US" sz="2400" b="1" i="1" smtClean="0">
+                <a:latin typeface="Arial" panose="020B0604020202020204" pitchFamily="34" charset="0"/>
+                <a:cs typeface="Arial" panose="020B0604020202020204" pitchFamily="34" charset="0"/>
+              </a:rPr>
+              <a:t>A: </a:t>
+            </a:r>
+            <a:r>
+              <a:rPr lang="en-US" sz="2400" i="1" smtClean="0">
+                <a:latin typeface="Arial" panose="020B0604020202020204" pitchFamily="34" charset="0"/>
+                <a:cs typeface="Arial" panose="020B0604020202020204" pitchFamily="34" charset="0"/>
+              </a:rPr>
+              <a:t>I …… Minh. …… to meet you!</a:t>
+            </a:r>
+          </a:p>
+          <a:p>
+            <a:r>
+              <a:rPr lang="en-US" sz="2400" b="1" i="1" smtClean="0">
+                <a:latin typeface="Arial" panose="020B0604020202020204" pitchFamily="34" charset="0"/>
+                <a:cs typeface="Arial" panose="020B0604020202020204" pitchFamily="34" charset="0"/>
+              </a:rPr>
+              <a:t>B: </a:t>
+            </a:r>
+            <a:r>
+              <a:rPr lang="en-US" sz="2400" i="1" smtClean="0">
+                <a:latin typeface="Arial" panose="020B0604020202020204" pitchFamily="34" charset="0"/>
+                <a:cs typeface="Arial" panose="020B0604020202020204" pitchFamily="34" charset="0"/>
+              </a:rPr>
+              <a:t>Nice to …… you, too.</a:t>
+            </a:r>
+          </a:p>
+        </p:txBody>
+      </p:sp>
+      <p:sp>
+        <p:nvSpPr>
+          <p:cNvPr id="6" name="TextBox 5"/>
+          <p:cNvSpPr txBox="1"/>
+          <p:nvPr/>
+        </p:nvSpPr>
+        <p:spPr>
+          <a:xfrm>
+            <a:off x="668909" y="4038600"/>
+            <a:ext cx="7941691" cy="2308324"/>
+          </a:xfrm>
+          <a:prstGeom prst="rect">
+            <a:avLst/>
+          </a:prstGeom>
+          <a:solidFill>
+            <a:schemeClr val="accent2">
+              <a:lumMod val="20000"/>
+              <a:lumOff val="80000"/>
+            </a:schemeClr>
+          </a:solidFill>
+        </p:spPr>
+        <p:txBody>
+          <a:bodyPr wrap="square" rtlCol="0">
+            <a:spAutoFit/>
+          </a:bodyPr>
+          <a:lstStyle/>
+          <a:p>
+            <a:r>
+              <a:rPr lang="en-US" sz="2400" b="1" smtClean="0">
+                <a:latin typeface="Arial" panose="020B0604020202020204" pitchFamily="34" charset="0"/>
+                <a:cs typeface="Arial" panose="020B0604020202020204" pitchFamily="34" charset="0"/>
+              </a:rPr>
+              <a:t>Dialogue 2 (hội thoại 2):</a:t>
+            </a:r>
+          </a:p>
+          <a:p>
+            <a:endParaRPr lang="en-US" sz="2400" b="1" smtClean="0">
+              <a:latin typeface="Arial" panose="020B0604020202020204" pitchFamily="34" charset="0"/>
+              <a:cs typeface="Arial" panose="020B0604020202020204" pitchFamily="34" charset="0"/>
+            </a:endParaRPr>
+          </a:p>
+          <a:p>
+            <a:r>
+              <a:rPr lang="en-US" sz="2400" b="1" i="1" smtClean="0">
+                <a:latin typeface="Arial" panose="020B0604020202020204" pitchFamily="34" charset="0"/>
+                <a:cs typeface="Arial" panose="020B0604020202020204" pitchFamily="34" charset="0"/>
+              </a:rPr>
+              <a:t>A: </a:t>
+            </a:r>
+            <a:r>
+              <a:rPr lang="en-US" sz="2400" i="1" smtClean="0">
+                <a:latin typeface="Arial" panose="020B0604020202020204" pitchFamily="34" charset="0"/>
+                <a:cs typeface="Arial" panose="020B0604020202020204" pitchFamily="34" charset="0"/>
+              </a:rPr>
+              <a:t>Good ……!</a:t>
+            </a:r>
+          </a:p>
+          <a:p>
+            <a:r>
+              <a:rPr lang="en-US" sz="2400" b="1" i="1" smtClean="0">
+                <a:latin typeface="Arial" panose="020B0604020202020204" pitchFamily="34" charset="0"/>
+                <a:cs typeface="Arial" panose="020B0604020202020204" pitchFamily="34" charset="0"/>
+              </a:rPr>
+              <a:t>B: </a:t>
+            </a:r>
+            <a:r>
+              <a:rPr lang="en-US" sz="2400" i="1" smtClean="0">
+                <a:latin typeface="Arial" panose="020B0604020202020204" pitchFamily="34" charset="0"/>
+                <a:cs typeface="Arial" panose="020B0604020202020204" pitchFamily="34" charset="0"/>
+              </a:rPr>
+              <a:t>Good ……! I …….. Phuong. What is your ……?</a:t>
+            </a:r>
+          </a:p>
+          <a:p>
+            <a:r>
+              <a:rPr lang="en-US" sz="2400" b="1" i="1" smtClean="0">
+                <a:latin typeface="Arial" panose="020B0604020202020204" pitchFamily="34" charset="0"/>
+                <a:cs typeface="Arial" panose="020B0604020202020204" pitchFamily="34" charset="0"/>
+              </a:rPr>
+              <a:t>A: </a:t>
+            </a:r>
+            <a:r>
+              <a:rPr lang="en-US" sz="2400" i="1" smtClean="0">
+                <a:latin typeface="Arial" panose="020B0604020202020204" pitchFamily="34" charset="0"/>
+                <a:cs typeface="Arial" panose="020B0604020202020204" pitchFamily="34" charset="0"/>
+              </a:rPr>
+              <a:t>My name …… Lan. Glad to …… you!</a:t>
+            </a:r>
+          </a:p>
+          <a:p>
+            <a:r>
+              <a:rPr lang="en-US" sz="2400" b="1" i="1" smtClean="0">
+                <a:latin typeface="Arial" panose="020B0604020202020204" pitchFamily="34" charset="0"/>
+                <a:cs typeface="Arial" panose="020B0604020202020204" pitchFamily="34" charset="0"/>
+              </a:rPr>
+              <a:t>B: </a:t>
+            </a:r>
+            <a:r>
+              <a:rPr lang="en-US" sz="2400" i="1" smtClean="0">
+                <a:latin typeface="Arial" panose="020B0604020202020204" pitchFamily="34" charset="0"/>
+                <a:cs typeface="Arial" panose="020B0604020202020204" pitchFamily="34" charset="0"/>
+              </a:rPr>
+              <a:t>Nice to ….. You, too.</a:t>
+            </a:r>
+          </a:p>
+        </p:txBody>
+      </p:sp>
+    </p:spTree>
+    <p:extLst>
+      <p:ext uri="{BB962C8B-B14F-4D97-AF65-F5344CB8AC3E}">
+        <p14:creationId xmlns:p14="http://schemas.microsoft.com/office/powerpoint/2010/main" val="460159437"/>
+      </p:ext>
+    </p:extLst>
+  </p:cSld>
+  <p:clrMapOvr>
+    <a:masterClrMapping/>
+  </p:clrMapOvr>
+  <p:timing>
+    <p:tnLst>
+      <p:par>
+        <p:cTn id="1" dur="indefinite" restart="never" nodeType="tmRoot"/>
+      </p:par>
+    </p:tnLst>
+  </p:timing>
+</p:sld>
+</file>
+
+<file path=ppt/slides/slide8.xml><?xml version="1.0" encoding="utf-8"?>
+<p:sld xmlns:a="http://schemas.openxmlformats.org/drawingml/2006/main" xmlns:r="http://schemas.openxmlformats.org/officeDocument/2006/relationships" xmlns:p="http://schemas.openxmlformats.org/presentationml/2006/main">
+  <p:cSld>
+    <p:spTree>
+      <p:nvGrpSpPr>
+        <p:cNvPr id="1" name=""/>
+        <p:cNvGrpSpPr/>
+        <p:nvPr/>
+      </p:nvGrpSpPr>
+      <p:grpSpPr>
+        <a:xfrm>
+          <a:off x="0" y="0"/>
+          <a:ext cx="0" cy="0"/>
+          <a:chOff x="0" y="0"/>
+          <a:chExt cx="0" cy="0"/>
+        </a:xfrm>
+      </p:grpSpPr>
+      <p:sp>
+        <p:nvSpPr>
+          <p:cNvPr id="3" name="Title 2"/>
+          <p:cNvSpPr>
+            <a:spLocks noGrp="1"/>
+          </p:cNvSpPr>
+          <p:nvPr>
+            <p:ph type="ctrTitle"/>
+          </p:nvPr>
+        </p:nvSpPr>
+        <p:spPr>
+          <a:xfrm>
+            <a:off x="689264" y="1"/>
+            <a:ext cx="8454736" cy="1470025"/>
+          </a:xfrm>
+        </p:spPr>
+        <p:txBody>
+          <a:bodyPr>
+            <a:normAutofit/>
+          </a:bodyPr>
+          <a:lstStyle/>
+          <a:p>
+            <a:pPr algn="l"/>
+            <a:r>
+              <a:rPr lang="en-US" b="1" smtClean="0">
+                <a:solidFill>
+                  <a:srgbClr val="FF0000"/>
+                </a:solidFill>
+                <a:latin typeface="Arial" panose="020B0604020202020204" pitchFamily="34" charset="0"/>
+                <a:cs typeface="Arial" panose="020B0604020202020204" pitchFamily="34" charset="0"/>
+              </a:rPr>
+              <a:t>Wrap-up </a:t>
+            </a:r>
+            <a:r>
+              <a:rPr lang="en-US" sz="2800" i="1" smtClean="0">
+                <a:solidFill>
+                  <a:srgbClr val="FF0000"/>
+                </a:solidFill>
+                <a:latin typeface="Arial" panose="020B0604020202020204" pitchFamily="34" charset="0"/>
+                <a:cs typeface="Arial" panose="020B0604020202020204" pitchFamily="34" charset="0"/>
+              </a:rPr>
+              <a:t>(Tổng kết)</a:t>
+            </a:r>
+            <a:r>
+              <a:rPr lang="en-US" sz="2800" i="1" smtClean="0">
+                <a:solidFill>
+                  <a:srgbClr val="FF0000"/>
+                </a:solidFill>
+                <a:latin typeface="Arial" panose="020B0604020202020204" pitchFamily="34" charset="0"/>
+                <a:cs typeface="Arial" panose="020B0604020202020204" pitchFamily="34" charset="0"/>
+              </a:rPr>
+              <a:t/>
+            </a:r>
+            <a:br>
+              <a:rPr lang="en-US" sz="2800" i="1" smtClean="0">
+                <a:solidFill>
+                  <a:srgbClr val="FF0000"/>
+                </a:solidFill>
+                <a:latin typeface="Arial" panose="020B0604020202020204" pitchFamily="34" charset="0"/>
+                <a:cs typeface="Arial" panose="020B0604020202020204" pitchFamily="34" charset="0"/>
+              </a:rPr>
+            </a:br>
+            <a:endParaRPr lang="en-US" sz="1800" i="1">
+              <a:solidFill>
+                <a:schemeClr val="bg1">
+                  <a:lumMod val="50000"/>
+                </a:schemeClr>
+              </a:solidFill>
+              <a:latin typeface="Arial" panose="020B0604020202020204" pitchFamily="34" charset="0"/>
+              <a:cs typeface="Arial" panose="020B0604020202020204" pitchFamily="34" charset="0"/>
+            </a:endParaRPr>
+          </a:p>
+        </p:txBody>
+      </p:sp>
+      <p:cxnSp>
+        <p:nvCxnSpPr>
+          <p:cNvPr id="8" name="Straight Connector 7"/>
+          <p:cNvCxnSpPr/>
+          <p:nvPr/>
+        </p:nvCxnSpPr>
+        <p:spPr>
+          <a:xfrm>
+            <a:off x="0" y="1447800"/>
+            <a:ext cx="9144000" cy="0"/>
+          </a:xfrm>
+          <a:prstGeom prst="line">
+            <a:avLst/>
+          </a:prstGeom>
+        </p:spPr>
+        <p:style>
+          <a:lnRef idx="1">
+            <a:schemeClr val="accent1"/>
+          </a:lnRef>
+          <a:fillRef idx="0">
+            <a:schemeClr val="accent1"/>
+          </a:fillRef>
+          <a:effectRef idx="0">
+            <a:schemeClr val="accent1"/>
+          </a:effectRef>
+          <a:fontRef idx="minor">
+            <a:schemeClr val="tx1"/>
+          </a:fontRef>
+        </p:style>
+      </p:cxnSp>
+      <p:sp>
+        <p:nvSpPr>
+          <p:cNvPr id="5" name="TextBox 4"/>
+          <p:cNvSpPr txBox="1"/>
+          <p:nvPr/>
+        </p:nvSpPr>
+        <p:spPr>
+          <a:xfrm>
+            <a:off x="304800" y="2133600"/>
+            <a:ext cx="5226147" cy="3785652"/>
+          </a:xfrm>
+          <a:prstGeom prst="rect">
+            <a:avLst/>
+          </a:prstGeom>
+        </p:spPr>
+        <p:style>
+          <a:lnRef idx="1">
+            <a:schemeClr val="accent2"/>
+          </a:lnRef>
+          <a:fillRef idx="2">
+            <a:schemeClr val="accent2"/>
+          </a:fillRef>
+          <a:effectRef idx="1">
+            <a:schemeClr val="accent2"/>
+          </a:effectRef>
+          <a:fontRef idx="minor">
+            <a:schemeClr val="dk1"/>
+          </a:fontRef>
+        </p:style>
+        <p:txBody>
+          <a:bodyPr wrap="square" rtlCol="0">
+            <a:spAutoFit/>
+          </a:bodyPr>
+          <a:lstStyle/>
+          <a:p>
+            <a:pPr marL="342900" indent="-342900">
+              <a:buFont typeface="Arial" panose="020B0604020202020204" pitchFamily="34" charset="0"/>
+              <a:buChar char="•"/>
+            </a:pPr>
+            <a:r>
+              <a:rPr lang="en-US" sz="2000" smtClean="0">
+                <a:latin typeface="Arial" panose="020B0604020202020204" pitchFamily="34" charset="0"/>
+                <a:cs typeface="Arial" panose="020B0604020202020204" pitchFamily="34" charset="0"/>
+              </a:rPr>
+              <a:t>Words related to telling about yourself</a:t>
+            </a:r>
+          </a:p>
+          <a:p>
+            <a:r>
+              <a:rPr lang="en-US" sz="2000" i="1" smtClean="0">
+                <a:latin typeface="Arial" panose="020B0604020202020204" pitchFamily="34" charset="0"/>
+                <a:cs typeface="Arial" panose="020B0604020202020204" pitchFamily="34" charset="0"/>
+              </a:rPr>
+              <a:t>(Một số từ liên quan đến chủ đề giới thiệu bản thân)</a:t>
+            </a:r>
+          </a:p>
+          <a:p>
+            <a:endParaRPr lang="en-US" sz="2000" i="1">
+              <a:latin typeface="Arial" panose="020B0604020202020204" pitchFamily="34" charset="0"/>
+              <a:cs typeface="Arial" panose="020B0604020202020204" pitchFamily="34" charset="0"/>
+            </a:endParaRPr>
+          </a:p>
+          <a:p>
+            <a:pPr marL="342900" indent="-342900">
+              <a:buFont typeface="Arial" panose="020B0604020202020204" pitchFamily="34" charset="0"/>
+              <a:buChar char="•"/>
+            </a:pPr>
+            <a:r>
+              <a:rPr lang="en-US" sz="2000" i="1" smtClean="0">
+                <a:latin typeface="Arial" panose="020B0604020202020204" pitchFamily="34" charset="0"/>
+                <a:cs typeface="Arial" panose="020B0604020202020204" pitchFamily="34" charset="0"/>
+              </a:rPr>
+              <a:t>Structure (Cấu trúc)</a:t>
+            </a:r>
+          </a:p>
+          <a:p>
+            <a:r>
+              <a:rPr lang="en-US" sz="2000" b="1" smtClean="0">
+                <a:latin typeface="Arial" panose="020B0604020202020204" pitchFamily="34" charset="0"/>
+                <a:cs typeface="Arial" panose="020B0604020202020204" pitchFamily="34" charset="0"/>
+              </a:rPr>
+              <a:t>What is your name?</a:t>
+            </a:r>
+          </a:p>
+          <a:p>
+            <a:r>
+              <a:rPr lang="en-US" sz="2000" b="1" smtClean="0">
+                <a:latin typeface="Arial" panose="020B0604020202020204" pitchFamily="34" charset="0"/>
+                <a:cs typeface="Arial" panose="020B0604020202020204" pitchFamily="34" charset="0"/>
+              </a:rPr>
+              <a:t>My name is ……/ I am ……</a:t>
+            </a:r>
+            <a:r>
+              <a:rPr lang="en-US" sz="2000" i="1" smtClean="0">
+                <a:latin typeface="Arial" panose="020B0604020202020204" pitchFamily="34" charset="0"/>
+                <a:cs typeface="Arial" panose="020B0604020202020204" pitchFamily="34" charset="0"/>
+              </a:rPr>
+              <a:t> (Tên của tôi là……/ Tôi là……)</a:t>
+            </a:r>
+          </a:p>
+          <a:p>
+            <a:pPr marL="342900" indent="-342900">
+              <a:buFont typeface="Arial" panose="020B0604020202020204" pitchFamily="34" charset="0"/>
+              <a:buChar char="•"/>
+            </a:pPr>
+            <a:r>
+              <a:rPr lang="en-US" sz="2000" i="1" smtClean="0">
+                <a:latin typeface="Arial" panose="020B0604020202020204" pitchFamily="34" charset="0"/>
+                <a:cs typeface="Arial" panose="020B0604020202020204" pitchFamily="34" charset="0"/>
+              </a:rPr>
+              <a:t>1 số diễn đạt thông dụng</a:t>
+            </a:r>
+          </a:p>
+          <a:p>
+            <a:pPr marL="342900" indent="-342900">
+              <a:buFont typeface="Arial" panose="020B0604020202020204" pitchFamily="34" charset="0"/>
+              <a:buChar char="•"/>
+            </a:pPr>
+            <a:r>
+              <a:rPr lang="en-US" sz="2000" smtClean="0">
+                <a:latin typeface="Arial" panose="020B0604020202020204" pitchFamily="34" charset="0"/>
+                <a:cs typeface="Arial" panose="020B0604020202020204" pitchFamily="34" charset="0"/>
+              </a:rPr>
+              <a:t>Practice a conversation about telling about your self </a:t>
+            </a:r>
+            <a:r>
+              <a:rPr lang="en-US" i="1" smtClean="0">
+                <a:latin typeface="Arial" panose="020B0604020202020204" pitchFamily="34" charset="0"/>
+                <a:cs typeface="Arial" panose="020B0604020202020204" pitchFamily="34" charset="0"/>
+              </a:rPr>
+              <a:t>(Thực hành đoạn hội thoại về giới thiệu bản thân)</a:t>
+            </a:r>
+            <a:endParaRPr lang="en-US" i="1">
+              <a:latin typeface="Arial" panose="020B0604020202020204" pitchFamily="34" charset="0"/>
+              <a:cs typeface="Arial" panose="020B0604020202020204" pitchFamily="34" charset="0"/>
+            </a:endParaRPr>
+          </a:p>
+        </p:txBody>
+      </p:sp>
+      <p:pic>
+        <p:nvPicPr>
+          <p:cNvPr id="1026" name="Picture 2" descr="Kết quả hình ảnh cho picture of conversation"/>
+          <p:cNvPicPr>
+            <a:picLocks noChangeAspect="1" noChangeArrowheads="1"/>
+          </p:cNvPicPr>
+          <p:nvPr/>
+        </p:nvPicPr>
+        <p:blipFill>
+          <a:blip r:embed="rId2">
+            <a:extLst>
+              <a:ext uri="{28A0092B-C50C-407E-A947-70E740481C1C}">
+                <a14:useLocalDpi xmlns:a14="http://schemas.microsoft.com/office/drawing/2010/main" val="0"/>
+              </a:ext>
+            </a:extLst>
+          </a:blip>
+          <a:srcRect/>
+          <a:stretch>
+            <a:fillRect/>
+          </a:stretch>
+        </p:blipFill>
+        <p:spPr bwMode="auto">
+          <a:xfrm>
+            <a:off x="5638800" y="2895600"/>
+            <a:ext cx="2790825" cy="2496435"/>
+          </a:xfrm>
+          <a:prstGeom prst="rect">
+            <a:avLst/>
+          </a:prstGeom>
+          <a:noFill/>
+          <a:extLst>
+            <a:ext uri="{909E8E84-426E-40DD-AFC4-6F175D3DCCD1}">
+              <a14:hiddenFill xmlns:a14="http://schemas.microsoft.com/office/drawing/2010/main">
+                <a:solidFill>
+                  <a:srgbClr val="FFFFFF"/>
+                </a:solidFill>
+              </a14:hiddenFill>
+            </a:ext>
+          </a:extLst>
+        </p:spPr>
+      </p:pic>
+    </p:spTree>
+    <p:extLst>
+      <p:ext uri="{BB962C8B-B14F-4D97-AF65-F5344CB8AC3E}">
+        <p14:creationId xmlns:p14="http://schemas.microsoft.com/office/powerpoint/2010/main" val="2601806985"/>
       </p:ext>
     </p:extLst>
   </p:cSld>

</xml_diff>